<commit_message>
UX Personas and Workflow
</commit_message>
<xml_diff>
--- a/Deliverables/UX/InFlow Personas and Workflows.pptx
+++ b/Deliverables/UX/InFlow Personas and Workflows.pptx
@@ -259,7 +259,7 @@
             <a:fld id="{16BB189A-303D-A44B-9B37-553C119376E8}" type="datetime1">
               <a:rPr lang="en-GB"/>
               <a:pPr/>
-              <a:t>20/03/2015</a:t>
+              <a:t>21/03/2015</a:t>
             </a:fld>
             <a:endParaRPr lang="en-GB" dirty="0"/>
           </a:p>
@@ -771,7 +771,7 @@
             <a:fld id="{D449701E-DF7B-FC43-9147-F33954BBFC55}" type="datetime1">
               <a:rPr lang="en-GB"/>
               <a:pPr/>
-              <a:t>20/03/2015</a:t>
+              <a:t>21/03/2015</a:t>
             </a:fld>
             <a:endParaRPr lang="en-GB" dirty="0"/>
           </a:p>
@@ -958,7 +958,7 @@
             <a:fld id="{824C5A96-E53C-6D45-A11F-E87E11EBEBEC}" type="datetime1">
               <a:rPr lang="en-GB"/>
               <a:pPr/>
-              <a:t>20/03/2015</a:t>
+              <a:t>21/03/2015</a:t>
             </a:fld>
             <a:endParaRPr lang="en-GB" dirty="0"/>
           </a:p>
@@ -1155,7 +1155,7 @@
             <a:fld id="{8ACD6CDC-39A9-1342-8264-E6DE9FD6CC2A}" type="datetime1">
               <a:rPr lang="en-GB"/>
               <a:pPr/>
-              <a:t>20/03/2015</a:t>
+              <a:t>21/03/2015</a:t>
             </a:fld>
             <a:endParaRPr lang="en-GB" dirty="0"/>
           </a:p>
@@ -1498,7 +1498,7 @@
             <a:fld id="{20779CB9-85E8-144F-88A1-D9DC43A3A9ED}" type="datetime1">
               <a:rPr lang="en-GB"/>
               <a:pPr/>
-              <a:t>20/03/2015</a:t>
+              <a:t>21/03/2015</a:t>
             </a:fld>
             <a:endParaRPr lang="en-GB" dirty="0"/>
           </a:p>
@@ -1761,7 +1761,7 @@
             <a:fld id="{47B6E86B-CA8B-EC49-A614-1CAAFAF2755F}" type="datetime1">
               <a:rPr lang="en-GB"/>
               <a:pPr/>
-              <a:t>20/03/2015</a:t>
+              <a:t>21/03/2015</a:t>
             </a:fld>
             <a:endParaRPr lang="en-GB" dirty="0"/>
           </a:p>
@@ -2066,7 +2066,7 @@
             <a:fld id="{E983D181-CA88-9548-8894-52EDF26511FF}" type="datetime1">
               <a:rPr lang="en-GB"/>
               <a:pPr/>
-              <a:t>20/03/2015</a:t>
+              <a:t>21/03/2015</a:t>
             </a:fld>
             <a:endParaRPr lang="en-GB" dirty="0"/>
           </a:p>
@@ -2505,7 +2505,7 @@
             <a:fld id="{86AD328C-876C-C94A-930A-932BFC8D3BE8}" type="datetime1">
               <a:rPr lang="en-GB"/>
               <a:pPr/>
-              <a:t>20/03/2015</a:t>
+              <a:t>21/03/2015</a:t>
             </a:fld>
             <a:endParaRPr lang="en-GB" dirty="0"/>
           </a:p>
@@ -2640,7 +2640,7 @@
             <a:fld id="{463BC761-A559-DC40-8519-21E34059BF3F}" type="datetime1">
               <a:rPr lang="en-GB"/>
               <a:pPr/>
-              <a:t>20/03/2015</a:t>
+              <a:t>21/03/2015</a:t>
             </a:fld>
             <a:endParaRPr lang="en-GB" dirty="0"/>
           </a:p>
@@ -2752,7 +2752,7 @@
             <a:fld id="{E4323F97-58A7-AE45-9E14-DFB5DCC69645}" type="datetime1">
               <a:rPr lang="en-GB"/>
               <a:pPr/>
-              <a:t>20/03/2015</a:t>
+              <a:t>21/03/2015</a:t>
             </a:fld>
             <a:endParaRPr lang="en-GB" dirty="0"/>
           </a:p>
@@ -3046,7 +3046,7 @@
             <a:fld id="{65C2296D-D50A-9C42-B22B-F1D2BC5173F5}" type="datetime1">
               <a:rPr lang="en-GB"/>
               <a:pPr/>
-              <a:t>20/03/2015</a:t>
+              <a:t>21/03/2015</a:t>
             </a:fld>
             <a:endParaRPr lang="en-GB" dirty="0"/>
           </a:p>
@@ -3323,7 +3323,7 @@
             <a:fld id="{496ADF8F-E948-A847-AB19-360EA162911B}" type="datetime1">
               <a:rPr lang="en-GB"/>
               <a:pPr/>
-              <a:t>20/03/2015</a:t>
+              <a:t>21/03/2015</a:t>
             </a:fld>
             <a:endParaRPr lang="en-GB" dirty="0"/>
           </a:p>
@@ -3445,14 +3445,14 @@
               <ma14:placeholderFlag xmlns:ma14="http://schemas.microsoft.com/office/mac/drawingml/2011/main" val="1"/>
             </a:ext>
             <a:ext uri="{909E8E84-426E-40dd-AFC4-6F175D3DCCD1}">
-              <a14:hiddenFill xmlns="" xmlns:a14="http://schemas.microsoft.com/office/drawing/2010/main">
+              <a14:hiddenFill xmlns:a14="http://schemas.microsoft.com/office/drawing/2010/main" xmlns="">
                 <a:solidFill>
                   <a:srgbClr val="FFFFFF"/>
                 </a:solidFill>
               </a14:hiddenFill>
             </a:ext>
             <a:ext uri="{91240B29-F687-4f45-9708-019B960494DF}">
-              <a14:hiddenLine xmlns="" xmlns:a14="http://schemas.microsoft.com/office/drawing/2010/main" w="9525">
+              <a14:hiddenLine xmlns:a14="http://schemas.microsoft.com/office/drawing/2010/main" xmlns="" w="9525">
                 <a:solidFill>
                   <a:srgbClr val="000000"/>
                 </a:solidFill>
@@ -3507,14 +3507,14 @@
               <ma14:placeholderFlag xmlns:ma14="http://schemas.microsoft.com/office/mac/drawingml/2011/main" val="1"/>
             </a:ext>
             <a:ext uri="{909E8E84-426E-40dd-AFC4-6F175D3DCCD1}">
-              <a14:hiddenFill xmlns="" xmlns:a14="http://schemas.microsoft.com/office/drawing/2010/main">
+              <a14:hiddenFill xmlns:a14="http://schemas.microsoft.com/office/drawing/2010/main" xmlns="">
                 <a:solidFill>
                   <a:srgbClr val="FFFFFF"/>
                 </a:solidFill>
               </a14:hiddenFill>
             </a:ext>
             <a:ext uri="{91240B29-F687-4f45-9708-019B960494DF}">
-              <a14:hiddenLine xmlns="" xmlns:a14="http://schemas.microsoft.com/office/drawing/2010/main" w="9525">
+              <a14:hiddenLine xmlns:a14="http://schemas.microsoft.com/office/drawing/2010/main" xmlns="" w="9525">
                 <a:solidFill>
                   <a:srgbClr val="000000"/>
                 </a:solidFill>
@@ -3610,7 +3610,7 @@
             <a:fld id="{BF07F7E9-8057-D444-8E85-D2C5D3301CAE}" type="datetime1">
               <a:rPr lang="en-GB"/>
               <a:pPr/>
-              <a:t>20/03/2015</a:t>
+              <a:t>21/03/2015</a:t>
             </a:fld>
             <a:endParaRPr lang="en-GB" dirty="0"/>
           </a:p>
@@ -4206,14 +4206,14 @@
           </a:ln>
           <a:extLst>
             <a:ext uri="{909E8E84-426E-40dd-AFC4-6F175D3DCCD1}">
-              <a14:hiddenFill xmlns="" xmlns:a14="http://schemas.microsoft.com/office/drawing/2010/main">
+              <a14:hiddenFill xmlns:a14="http://schemas.microsoft.com/office/drawing/2010/main" xmlns="">
                 <a:solidFill>
                   <a:srgbClr val="FFFFFF"/>
                 </a:solidFill>
               </a14:hiddenFill>
             </a:ext>
             <a:ext uri="{91240B29-F687-4f45-9708-019B960494DF}">
-              <a14:hiddenLine xmlns="" xmlns:a14="http://schemas.microsoft.com/office/drawing/2010/main" w="9525">
+              <a14:hiddenLine xmlns:a14="http://schemas.microsoft.com/office/drawing/2010/main" xmlns="" w="9525">
                 <a:solidFill>
                   <a:srgbClr val="000000"/>
                 </a:solidFill>
@@ -4415,15 +4415,6 @@
               </a:rPr>
               <a:t>Beth</a:t>
             </a:r>
-            <a:endParaRPr lang="en-GB" sz="1400" dirty="0" smtClean="0">
-              <a:solidFill>
-                <a:schemeClr val="bg1">
-                  <a:lumMod val="50000"/>
-                </a:schemeClr>
-              </a:solidFill>
-              <a:latin typeface="Roboto Light"/>
-              <a:cs typeface="Roboto Light"/>
-            </a:endParaRPr>
           </a:p>
           <a:p>
             <a:pPr eaLnBrk="1" hangingPunct="1"/>
@@ -4700,13 +4691,6 @@
               </a:rPr>
               <a:t>Beth is a 35 year old woman interested in buying a new home. She wants to make an informed decision about her purchase, including information about the surrounding area</a:t>
             </a:r>
-            <a:endParaRPr lang="en-GB" sz="1200" dirty="0" smtClean="0">
-              <a:solidFill>
-                <a:srgbClr val="7F7F7F"/>
-              </a:solidFill>
-              <a:latin typeface="Roboto Light"/>
-              <a:cs typeface="Roboto Light"/>
-            </a:endParaRPr>
           </a:p>
           <a:p>
             <a:pPr eaLnBrk="1" hangingPunct="1"/>
@@ -4899,13 +4883,6 @@
               </a:rPr>
               <a:t> according to Beth’s criteria, as well as in an area that will provide a strong long-term investment</a:t>
             </a:r>
-            <a:endParaRPr lang="en-GB" sz="1200" dirty="0" smtClean="0">
-              <a:solidFill>
-                <a:srgbClr val="7F7F7F"/>
-              </a:solidFill>
-              <a:latin typeface="Roboto Light"/>
-              <a:cs typeface="Roboto Light"/>
-            </a:endParaRPr>
           </a:p>
           <a:p>
             <a:pPr eaLnBrk="1" hangingPunct="1"/>
@@ -5092,14 +5069,14 @@
           </a:ln>
           <a:extLst>
             <a:ext uri="{909E8E84-426E-40dd-AFC4-6F175D3DCCD1}">
-              <a14:hiddenFill xmlns="" xmlns:a14="http://schemas.microsoft.com/office/drawing/2010/main">
+              <a14:hiddenFill xmlns:a14="http://schemas.microsoft.com/office/drawing/2010/main" xmlns="">
                 <a:solidFill>
                   <a:srgbClr val="FFFFFF"/>
                 </a:solidFill>
               </a14:hiddenFill>
             </a:ext>
             <a:ext uri="{91240B29-F687-4f45-9708-019B960494DF}">
-              <a14:hiddenLine xmlns="" xmlns:a14="http://schemas.microsoft.com/office/drawing/2010/main" w="9525">
+              <a14:hiddenLine xmlns:a14="http://schemas.microsoft.com/office/drawing/2010/main" xmlns="" w="9525">
                 <a:solidFill>
                   <a:srgbClr val="000000"/>
                 </a:solidFill>
@@ -5301,15 +5278,6 @@
               </a:rPr>
               <a:t>Blake</a:t>
             </a:r>
-            <a:endParaRPr lang="en-GB" sz="1400" dirty="0" smtClean="0">
-              <a:solidFill>
-                <a:schemeClr val="bg1">
-                  <a:lumMod val="50000"/>
-                </a:schemeClr>
-              </a:solidFill>
-              <a:latin typeface="Roboto Light"/>
-              <a:cs typeface="Roboto Light"/>
-            </a:endParaRPr>
           </a:p>
           <a:p>
             <a:pPr eaLnBrk="1" hangingPunct="1"/>
@@ -5415,29 +5383,6 @@
           </a:fontRef>
         </p:style>
       </p:cxnSp>
-      <p:pic>
-        <p:nvPicPr>
-          <p:cNvPr id="11" name="Picture 10"/>
-          <p:cNvPicPr>
-            <a:picLocks noChangeAspect="1"/>
-          </p:cNvPicPr>
-          <p:nvPr/>
-        </p:nvPicPr>
-        <p:blipFill rotWithShape="1">
-          <a:blip r:embed="rId2"/>
-          <a:srcRect l="32713" r="22668"/>
-          <a:stretch/>
-        </p:blipFill>
-        <p:spPr>
-          <a:xfrm>
-            <a:off x="700916" y="2348880"/>
-            <a:ext cx="2970217" cy="3744416"/>
-          </a:xfrm>
-          <a:prstGeom prst="rect">
-            <a:avLst/>
-          </a:prstGeom>
-        </p:spPr>
-      </p:pic>
       <p:sp>
         <p:nvSpPr>
           <p:cNvPr id="12" name="TextBox 12"/>
@@ -5609,13 +5554,6 @@
               </a:rPr>
               <a:t>Blake is a 32 year old researcher working for a federal agency. He is tasked with compiling reports about regions of the country involving the aggregation about environmental quality data, unemployment, and crime rates.</a:t>
             </a:r>
-            <a:endParaRPr lang="en-GB" sz="1200" dirty="0" smtClean="0">
-              <a:solidFill>
-                <a:srgbClr val="7F7F7F"/>
-              </a:solidFill>
-              <a:latin typeface="Roboto Light"/>
-              <a:cs typeface="Roboto Light"/>
-            </a:endParaRPr>
           </a:p>
           <a:p>
             <a:pPr eaLnBrk="1" hangingPunct="1"/>
@@ -5735,13 +5673,6 @@
               </a:rPr>
               <a:t>View demographic information about people in a county</a:t>
             </a:r>
-            <a:endParaRPr lang="en-GB" sz="1200" dirty="0" smtClean="0">
-              <a:solidFill>
-                <a:srgbClr val="7F7F7F"/>
-              </a:solidFill>
-              <a:latin typeface="Roboto Light"/>
-              <a:cs typeface="Roboto Light"/>
-            </a:endParaRPr>
           </a:p>
           <a:p>
             <a:pPr eaLnBrk="1" hangingPunct="1">
@@ -5782,13 +5713,6 @@
               </a:rPr>
               <a:t>To gather sufficient data to provide intelligent reports enabling informed decision making to his supervisors</a:t>
             </a:r>
-            <a:endParaRPr lang="en-GB" sz="1200" dirty="0" smtClean="0">
-              <a:solidFill>
-                <a:srgbClr val="7F7F7F"/>
-              </a:solidFill>
-              <a:latin typeface="Roboto Light"/>
-              <a:cs typeface="Roboto Light"/>
-            </a:endParaRPr>
           </a:p>
           <a:p>
             <a:pPr eaLnBrk="1" hangingPunct="1"/>
@@ -5839,6 +5763,36 @@
           </a:p>
         </p:txBody>
       </p:sp>
+      <p:pic>
+        <p:nvPicPr>
+          <p:cNvPr id="3" name="Picture 2" descr="images-3.jpeg"/>
+          <p:cNvPicPr>
+            <a:picLocks noChangeAspect="1"/>
+          </p:cNvPicPr>
+          <p:nvPr/>
+        </p:nvPicPr>
+        <p:blipFill>
+          <a:blip r:embed="rId2">
+            <a:extLst>
+              <a:ext uri="{28A0092B-C50C-407E-A947-70E740481C1C}">
+                <a14:useLocalDpi xmlns:a14="http://schemas.microsoft.com/office/drawing/2010/main" val="0"/>
+              </a:ext>
+            </a:extLst>
+          </a:blip>
+          <a:stretch>
+            <a:fillRect/>
+          </a:stretch>
+        </p:blipFill>
+        <p:spPr>
+          <a:xfrm>
+            <a:off x="975825" y="2119108"/>
+            <a:ext cx="2324100" cy="3492500"/>
+          </a:xfrm>
+          <a:prstGeom prst="rect">
+            <a:avLst/>
+          </a:prstGeom>
+        </p:spPr>
+      </p:pic>
     </p:spTree>
     <p:extLst>
       <p:ext uri="{BB962C8B-B14F-4D97-AF65-F5344CB8AC3E}">
@@ -6012,14 +5966,14 @@
           </a:ln>
           <a:extLst>
             <a:ext uri="{909E8E84-426E-40dd-AFC4-6F175D3DCCD1}">
-              <a14:hiddenFill xmlns="" xmlns:a14="http://schemas.microsoft.com/office/drawing/2010/main">
+              <a14:hiddenFill xmlns:a14="http://schemas.microsoft.com/office/drawing/2010/main" xmlns="">
                 <a:solidFill>
                   <a:srgbClr val="FFFFFF"/>
                 </a:solidFill>
               </a14:hiddenFill>
             </a:ext>
             <a:ext uri="{91240B29-F687-4f45-9708-019B960494DF}">
-              <a14:hiddenLine xmlns="" xmlns:a14="http://schemas.microsoft.com/office/drawing/2010/main" w="9525">
+              <a14:hiddenLine xmlns:a14="http://schemas.microsoft.com/office/drawing/2010/main" xmlns="" w="9525">
                 <a:solidFill>
                   <a:srgbClr val="000000"/>
                 </a:solidFill>
@@ -6221,15 +6175,6 @@
               </a:rPr>
               <a:t>Barbara</a:t>
             </a:r>
-            <a:endParaRPr lang="en-GB" sz="1400" dirty="0" smtClean="0">
-              <a:solidFill>
-                <a:schemeClr val="bg1">
-                  <a:lumMod val="50000"/>
-                </a:schemeClr>
-              </a:solidFill>
-              <a:latin typeface="Roboto Light"/>
-              <a:cs typeface="Roboto Light"/>
-            </a:endParaRPr>
           </a:p>
           <a:p>
             <a:pPr eaLnBrk="1" hangingPunct="1"/>
@@ -6469,13 +6414,6 @@
               </a:rPr>
               <a:t>Barbara is a 68 year old woman who is interested in exploring the living quality data of her county, as well as comparison against other counties</a:t>
             </a:r>
-            <a:endParaRPr lang="en-GB" sz="1200" dirty="0" smtClean="0">
-              <a:solidFill>
-                <a:srgbClr val="7F7F7F"/>
-              </a:solidFill>
-              <a:latin typeface="Roboto Light"/>
-              <a:cs typeface="Roboto Light"/>
-            </a:endParaRPr>
           </a:p>
           <a:p>
             <a:pPr eaLnBrk="1" hangingPunct="1"/>
@@ -6605,13 +6543,6 @@
               </a:rPr>
               <a:t>county</a:t>
             </a:r>
-            <a:endParaRPr lang="en-GB" sz="1200" dirty="0" smtClean="0">
-              <a:solidFill>
-                <a:srgbClr val="7F7F7F"/>
-              </a:solidFill>
-              <a:latin typeface="Roboto Light"/>
-              <a:cs typeface="Roboto Light"/>
-            </a:endParaRPr>
           </a:p>
           <a:p>
             <a:pPr eaLnBrk="1" hangingPunct="1">
@@ -6652,13 +6583,6 @@
               </a:rPr>
               <a:t>To discover more information about her county, and how it compares to other counties</a:t>
             </a:r>
-            <a:endParaRPr lang="en-GB" sz="1200" dirty="0" smtClean="0">
-              <a:solidFill>
-                <a:srgbClr val="7F7F7F"/>
-              </a:solidFill>
-              <a:latin typeface="Roboto Light"/>
-              <a:cs typeface="Roboto Light"/>
-            </a:endParaRPr>
           </a:p>
           <a:p>
             <a:pPr eaLnBrk="1" hangingPunct="1"/>
@@ -6879,14 +6803,14 @@
           </a:ln>
           <a:extLst>
             <a:ext uri="{909E8E84-426E-40dd-AFC4-6F175D3DCCD1}">
-              <a14:hiddenFill xmlns="" xmlns:a14="http://schemas.microsoft.com/office/drawing/2010/main">
+              <a14:hiddenFill xmlns:a14="http://schemas.microsoft.com/office/drawing/2010/main" xmlns="">
                 <a:solidFill>
                   <a:srgbClr val="FFFFFF"/>
                 </a:solidFill>
               </a14:hiddenFill>
             </a:ext>
             <a:ext uri="{91240B29-F687-4f45-9708-019B960494DF}">
-              <a14:hiddenLine xmlns="" xmlns:a14="http://schemas.microsoft.com/office/drawing/2010/main" w="9525">
+              <a14:hiddenLine xmlns:a14="http://schemas.microsoft.com/office/drawing/2010/main" xmlns="" w="9525">
                 <a:solidFill>
                   <a:srgbClr val="000000"/>
                 </a:solidFill>
@@ -7129,17 +7053,7 @@
                 <a:latin typeface="Roboto Light"/>
                 <a:cs typeface="Roboto Light"/>
               </a:rPr>
-              <a:t>New page loads </a:t>
-            </a:r>
-            <a:r>
-              <a:rPr lang="en-US" sz="1400" dirty="0" smtClean="0">
-                <a:solidFill>
-                  <a:srgbClr val="FFFFFF"/>
-                </a:solidFill>
-                <a:latin typeface="Roboto Light"/>
-                <a:cs typeface="Roboto Light"/>
-              </a:rPr>
-              <a:t>data for County</a:t>
+              <a:t>New page loads data for County</a:t>
             </a:r>
             <a:endParaRPr lang="en-US" sz="1400" dirty="0">
               <a:solidFill>

</xml_diff>

<commit_message>
Overall UX Evaluation Page
</commit_message>
<xml_diff>
--- a/Deliverables/UX/InFlow Personas and Workflows.pptx
+++ b/Deliverables/UX/InFlow Personas and Workflows.pptx
@@ -3445,14 +3445,14 @@
               <ma14:placeholderFlag xmlns:ma14="http://schemas.microsoft.com/office/mac/drawingml/2011/main" val="1"/>
             </a:ext>
             <a:ext uri="{909E8E84-426E-40dd-AFC4-6F175D3DCCD1}">
-              <a14:hiddenFill xmlns:a14="http://schemas.microsoft.com/office/drawing/2010/main" xmlns="">
+              <a14:hiddenFill xmlns="" xmlns:a14="http://schemas.microsoft.com/office/drawing/2010/main">
                 <a:solidFill>
                   <a:srgbClr val="FFFFFF"/>
                 </a:solidFill>
               </a14:hiddenFill>
             </a:ext>
             <a:ext uri="{91240B29-F687-4f45-9708-019B960494DF}">
-              <a14:hiddenLine xmlns:a14="http://schemas.microsoft.com/office/drawing/2010/main" xmlns="" w="9525">
+              <a14:hiddenLine xmlns="" xmlns:a14="http://schemas.microsoft.com/office/drawing/2010/main" w="9525">
                 <a:solidFill>
                   <a:srgbClr val="000000"/>
                 </a:solidFill>
@@ -3507,14 +3507,14 @@
               <ma14:placeholderFlag xmlns:ma14="http://schemas.microsoft.com/office/mac/drawingml/2011/main" val="1"/>
             </a:ext>
             <a:ext uri="{909E8E84-426E-40dd-AFC4-6F175D3DCCD1}">
-              <a14:hiddenFill xmlns:a14="http://schemas.microsoft.com/office/drawing/2010/main" xmlns="">
+              <a14:hiddenFill xmlns="" xmlns:a14="http://schemas.microsoft.com/office/drawing/2010/main">
                 <a:solidFill>
                   <a:srgbClr val="FFFFFF"/>
                 </a:solidFill>
               </a14:hiddenFill>
             </a:ext>
             <a:ext uri="{91240B29-F687-4f45-9708-019B960494DF}">
-              <a14:hiddenLine xmlns:a14="http://schemas.microsoft.com/office/drawing/2010/main" xmlns="" w="9525">
+              <a14:hiddenLine xmlns="" xmlns:a14="http://schemas.microsoft.com/office/drawing/2010/main" w="9525">
                 <a:solidFill>
                   <a:srgbClr val="000000"/>
                 </a:solidFill>
@@ -4206,14 +4206,14 @@
           </a:ln>
           <a:extLst>
             <a:ext uri="{909E8E84-426E-40dd-AFC4-6F175D3DCCD1}">
-              <a14:hiddenFill xmlns:a14="http://schemas.microsoft.com/office/drawing/2010/main" xmlns="">
+              <a14:hiddenFill xmlns="" xmlns:a14="http://schemas.microsoft.com/office/drawing/2010/main">
                 <a:solidFill>
                   <a:srgbClr val="FFFFFF"/>
                 </a:solidFill>
               </a14:hiddenFill>
             </a:ext>
             <a:ext uri="{91240B29-F687-4f45-9708-019B960494DF}">
-              <a14:hiddenLine xmlns:a14="http://schemas.microsoft.com/office/drawing/2010/main" xmlns="" w="9525">
+              <a14:hiddenLine xmlns="" xmlns:a14="http://schemas.microsoft.com/office/drawing/2010/main" w="9525">
                 <a:solidFill>
                   <a:srgbClr val="000000"/>
                 </a:solidFill>
@@ -4530,8 +4530,8 @@
         </p:nvSpPr>
         <p:spPr bwMode="auto">
           <a:xfrm>
-            <a:off x="4427984" y="1510868"/>
-            <a:ext cx="4464942" cy="4708981"/>
+            <a:off x="4427984" y="1268413"/>
+            <a:ext cx="4464942" cy="5816977"/>
           </a:xfrm>
           <a:prstGeom prst="rect">
             <a:avLst/>
@@ -4738,7 +4738,63 @@
           </a:p>
           <a:p>
             <a:pPr eaLnBrk="1" hangingPunct="1"/>
+            <a:endParaRPr lang="en-GB" sz="1200" dirty="0" smtClean="0">
+              <a:solidFill>
+                <a:srgbClr val="7F7F7F"/>
+              </a:solidFill>
+              <a:latin typeface="Roboto Light"/>
+              <a:cs typeface="Roboto Light"/>
+            </a:endParaRPr>
+          </a:p>
+          <a:p>
+            <a:pPr eaLnBrk="1" hangingPunct="1"/>
+            <a:r>
+              <a:rPr lang="en-US" sz="1200" dirty="0">
+                <a:latin typeface="Roboto Light"/>
+                <a:cs typeface="Roboto Light"/>
+              </a:rPr>
+              <a:t>Technology Skill Level</a:t>
+            </a:r>
+          </a:p>
+          <a:p>
+            <a:pPr eaLnBrk="1" hangingPunct="1"/>
+            <a:r>
+              <a:rPr lang="en-US" sz="1200" dirty="0">
+                <a:solidFill>
+                  <a:schemeClr val="bg1">
+                    <a:lumMod val="50000"/>
+                  </a:schemeClr>
+                </a:solidFill>
+                <a:latin typeface="Roboto Light"/>
+                <a:cs typeface="Roboto Light"/>
+              </a:rPr>
+              <a:t>This user is very comfortable using web technologies, and has high bandwidth access, allowing for an unimpeded browsing experience</a:t>
+            </a:r>
+            <a:r>
+              <a:rPr lang="en-US" sz="1200" dirty="0" smtClean="0">
+                <a:solidFill>
+                  <a:schemeClr val="bg1">
+                    <a:lumMod val="50000"/>
+                  </a:schemeClr>
+                </a:solidFill>
+                <a:latin typeface="Roboto Light"/>
+                <a:cs typeface="Roboto Light"/>
+              </a:rPr>
+              <a:t>. This user is likely to use either mobile or desktop devices to access the product.</a:t>
+            </a:r>
             <a:endParaRPr lang="en-GB" sz="1200" dirty="0">
+              <a:solidFill>
+                <a:schemeClr val="bg1">
+                  <a:lumMod val="50000"/>
+                </a:schemeClr>
+              </a:solidFill>
+              <a:latin typeface="Roboto Light"/>
+              <a:cs typeface="Roboto Light"/>
+            </a:endParaRPr>
+          </a:p>
+          <a:p>
+            <a:pPr eaLnBrk="1" hangingPunct="1"/>
+            <a:endParaRPr lang="en-GB" sz="1200" dirty="0" smtClean="0">
               <a:solidFill>
                 <a:srgbClr val="7F7F7F"/>
               </a:solidFill>
@@ -5069,14 +5125,14 @@
           </a:ln>
           <a:extLst>
             <a:ext uri="{909E8E84-426E-40dd-AFC4-6F175D3DCCD1}">
-              <a14:hiddenFill xmlns:a14="http://schemas.microsoft.com/office/drawing/2010/main" xmlns="">
+              <a14:hiddenFill xmlns="" xmlns:a14="http://schemas.microsoft.com/office/drawing/2010/main">
                 <a:solidFill>
                   <a:srgbClr val="FFFFFF"/>
                 </a:solidFill>
               </a14:hiddenFill>
             </a:ext>
             <a:ext uri="{91240B29-F687-4f45-9708-019B960494DF}">
-              <a14:hiddenLine xmlns:a14="http://schemas.microsoft.com/office/drawing/2010/main" xmlns="" w="9525">
+              <a14:hiddenLine xmlns="" xmlns:a14="http://schemas.microsoft.com/office/drawing/2010/main" w="9525">
                 <a:solidFill>
                   <a:srgbClr val="000000"/>
                 </a:solidFill>
@@ -5393,8 +5449,8 @@
         </p:nvSpPr>
         <p:spPr bwMode="auto">
           <a:xfrm>
-            <a:off x="4427984" y="1510868"/>
-            <a:ext cx="4464942" cy="4708981"/>
+            <a:off x="4427538" y="1268413"/>
+            <a:ext cx="4464942" cy="5816977"/>
           </a:xfrm>
           <a:prstGeom prst="rect">
             <a:avLst/>
@@ -5589,11 +5645,58 @@
                 <a:latin typeface="Roboto Light"/>
                 <a:cs typeface="Roboto Light"/>
               </a:rPr>
-              <a:t>To provide reports to his leadership with high level information about multiple counties within the United States to inform senior decision makers about the allocation of resources, or analysis of correlation of data</a:t>
+              <a:t>To provide reports to his leadership with high level information about multiple counties within the United States to inform senior decision makers about the allocation of resources, or analysis of correlation of </a:t>
+            </a:r>
+            <a:r>
+              <a:rPr lang="en-US" sz="1200" dirty="0" smtClean="0">
+                <a:solidFill>
+                  <a:srgbClr val="7F7F7F"/>
+                </a:solidFill>
+                <a:latin typeface="Roboto Light"/>
+                <a:cs typeface="Roboto Light"/>
+              </a:rPr>
+              <a:t>data</a:t>
+            </a:r>
+          </a:p>
+          <a:p>
+            <a:pPr eaLnBrk="1" hangingPunct="1"/>
+            <a:endParaRPr lang="en-US" sz="1200" dirty="0">
+              <a:solidFill>
+                <a:srgbClr val="7F7F7F"/>
+              </a:solidFill>
+              <a:latin typeface="Roboto Light"/>
+              <a:cs typeface="Roboto Light"/>
+            </a:endParaRPr>
+          </a:p>
+          <a:p>
+            <a:pPr eaLnBrk="1" hangingPunct="1"/>
+            <a:r>
+              <a:rPr lang="en-US" sz="1200" dirty="0" smtClean="0">
+                <a:latin typeface="Roboto Light"/>
+                <a:cs typeface="Roboto Light"/>
+              </a:rPr>
+              <a:t>Technology Skill Level</a:t>
+            </a:r>
+          </a:p>
+          <a:p>
+            <a:pPr eaLnBrk="1" hangingPunct="1"/>
+            <a:r>
+              <a:rPr lang="en-US" sz="1200" dirty="0" smtClean="0">
+                <a:solidFill>
+                  <a:schemeClr val="bg1">
+                    <a:lumMod val="50000"/>
+                  </a:schemeClr>
+                </a:solidFill>
+                <a:latin typeface="Roboto Light"/>
+                <a:cs typeface="Roboto Light"/>
+              </a:rPr>
+              <a:t>This user is very comfortable using web technologies, and has high bandwidth access, allowing for an unimpeded browsing experience. This user is more likely to use a desktop platform to access the product.</a:t>
             </a:r>
             <a:endParaRPr lang="en-GB" sz="1200" dirty="0" smtClean="0">
               <a:solidFill>
-                <a:srgbClr val="7F7F7F"/>
+                <a:schemeClr val="bg1">
+                  <a:lumMod val="50000"/>
+                </a:schemeClr>
               </a:solidFill>
               <a:latin typeface="Roboto Light"/>
               <a:cs typeface="Roboto Light"/>
@@ -5966,14 +6069,14 @@
           </a:ln>
           <a:extLst>
             <a:ext uri="{909E8E84-426E-40dd-AFC4-6F175D3DCCD1}">
-              <a14:hiddenFill xmlns:a14="http://schemas.microsoft.com/office/drawing/2010/main" xmlns="">
+              <a14:hiddenFill xmlns="" xmlns:a14="http://schemas.microsoft.com/office/drawing/2010/main">
                 <a:solidFill>
                   <a:srgbClr val="FFFFFF"/>
                 </a:solidFill>
               </a14:hiddenFill>
             </a:ext>
             <a:ext uri="{91240B29-F687-4f45-9708-019B960494DF}">
-              <a14:hiddenLine xmlns:a14="http://schemas.microsoft.com/office/drawing/2010/main" xmlns="" w="9525">
+              <a14:hiddenLine xmlns="" xmlns:a14="http://schemas.microsoft.com/office/drawing/2010/main" w="9525">
                 <a:solidFill>
                   <a:srgbClr val="000000"/>
                 </a:solidFill>
@@ -6253,8 +6356,8 @@
         </p:nvSpPr>
         <p:spPr bwMode="auto">
           <a:xfrm>
-            <a:off x="4427984" y="1510868"/>
-            <a:ext cx="4464942" cy="4524315"/>
+            <a:off x="4427984" y="1268760"/>
+            <a:ext cx="4464942" cy="5632311"/>
           </a:xfrm>
           <a:prstGeom prst="rect">
             <a:avLst/>
@@ -6449,7 +6552,64 @@
                 <a:latin typeface="Roboto Light"/>
                 <a:cs typeface="Roboto Light"/>
               </a:rPr>
-              <a:t>Barbara wants to discover data about the quality of her county across several dimensions primarily for informational purposes. She also would like to compare the data of her own county against that of others</a:t>
+              <a:t>Barbara wants to discover data about the quality of her county across several dimensions primarily for informational purposes. She also would like to compare the data of her own county against that of </a:t>
+            </a:r>
+            <a:r>
+              <a:rPr lang="en-US" sz="1200" dirty="0" smtClean="0">
+                <a:solidFill>
+                  <a:srgbClr val="7F7F7F"/>
+                </a:solidFill>
+                <a:latin typeface="Roboto Light"/>
+                <a:cs typeface="Roboto Light"/>
+              </a:rPr>
+              <a:t>others</a:t>
+            </a:r>
+          </a:p>
+          <a:p>
+            <a:pPr eaLnBrk="1" hangingPunct="1"/>
+            <a:endParaRPr lang="en-US" sz="1200" dirty="0">
+              <a:solidFill>
+                <a:srgbClr val="7F7F7F"/>
+              </a:solidFill>
+              <a:latin typeface="Roboto Light"/>
+              <a:cs typeface="Roboto Light"/>
+            </a:endParaRPr>
+          </a:p>
+          <a:p>
+            <a:pPr eaLnBrk="1" hangingPunct="1"/>
+            <a:r>
+              <a:rPr lang="en-US" sz="1200" dirty="0">
+                <a:latin typeface="Roboto Light"/>
+                <a:cs typeface="Roboto Light"/>
+              </a:rPr>
+              <a:t>Technology Skill Level</a:t>
+            </a:r>
+          </a:p>
+          <a:p>
+            <a:pPr eaLnBrk="1" hangingPunct="1"/>
+            <a:r>
+              <a:rPr lang="en-US" sz="1200" dirty="0">
+                <a:solidFill>
+                  <a:schemeClr val="bg1">
+                    <a:lumMod val="50000"/>
+                  </a:schemeClr>
+                </a:solidFill>
+                <a:latin typeface="Roboto Light"/>
+                <a:cs typeface="Roboto Light"/>
+              </a:rPr>
+              <a:t>This user is </a:t>
+            </a:r>
+            <a:r>
+              <a:rPr lang="en-US" sz="1200" dirty="0" smtClean="0">
+                <a:solidFill>
+                  <a:schemeClr val="bg1">
+                    <a:lumMod val="50000"/>
+                  </a:schemeClr>
+                </a:solidFill>
+                <a:latin typeface="Roboto Light"/>
+                <a:cs typeface="Roboto Light"/>
+              </a:rPr>
+              <a:t>not a new adopter, but is comfortable using web browsers. This users is likely to access the product via both desktop and mobile devices.</a:t>
             </a:r>
             <a:endParaRPr lang="en-GB" sz="1200" dirty="0" smtClean="0">
               <a:solidFill>
@@ -6803,14 +6963,14 @@
           </a:ln>
           <a:extLst>
             <a:ext uri="{909E8E84-426E-40dd-AFC4-6F175D3DCCD1}">
-              <a14:hiddenFill xmlns:a14="http://schemas.microsoft.com/office/drawing/2010/main" xmlns="">
+              <a14:hiddenFill xmlns="" xmlns:a14="http://schemas.microsoft.com/office/drawing/2010/main">
                 <a:solidFill>
                   <a:srgbClr val="FFFFFF"/>
                 </a:solidFill>
               </a14:hiddenFill>
             </a:ext>
             <a:ext uri="{91240B29-F687-4f45-9708-019B960494DF}">
-              <a14:hiddenLine xmlns:a14="http://schemas.microsoft.com/office/drawing/2010/main" xmlns="" w="9525">
+              <a14:hiddenLine xmlns="" xmlns:a14="http://schemas.microsoft.com/office/drawing/2010/main" w="9525">
                 <a:solidFill>
                   <a:srgbClr val="000000"/>
                 </a:solidFill>
@@ -7403,6 +7563,44 @@
               </a:solidFill>
               <a:latin typeface="Roboto Light"/>
               <a:cs typeface="Roboto Light"/>
+            </a:endParaRPr>
+          </a:p>
+        </p:txBody>
+      </p:sp>
+      <p:sp>
+        <p:nvSpPr>
+          <p:cNvPr id="2" name="TextBox 1"/>
+          <p:cNvSpPr txBox="1"/>
+          <p:nvPr/>
+        </p:nvSpPr>
+        <p:spPr>
+          <a:xfrm>
+            <a:off x="5568522" y="2163245"/>
+            <a:ext cx="2963917" cy="276999"/>
+          </a:xfrm>
+          <a:prstGeom prst="rect">
+            <a:avLst/>
+          </a:prstGeom>
+          <a:noFill/>
+        </p:spPr>
+        <p:txBody>
+          <a:bodyPr wrap="square" rtlCol="0">
+            <a:spAutoFit/>
+          </a:bodyPr>
+          <a:lstStyle/>
+          <a:p>
+            <a:r>
+              <a:rPr lang="en-US" sz="1200" dirty="0" smtClean="0">
+                <a:solidFill>
+                  <a:srgbClr val="FF0000"/>
+                </a:solidFill>
+              </a:rPr>
+              <a:t>*Verification of field data occurs here</a:t>
+            </a:r>
+            <a:endParaRPr lang="en-US" sz="1200" dirty="0">
+              <a:solidFill>
+                <a:srgbClr val="FF0000"/>
+              </a:solidFill>
             </a:endParaRPr>
           </a:p>
         </p:txBody>

</xml_diff>